<commit_message>
finished product pict added
</commit_message>
<xml_diff>
--- a/pictures/midibeat.pptx
+++ b/pictures/midibeat.pptx
@@ -8,6 +8,7 @@
     <p:sldId id="257" r:id="rId2"/>
     <p:sldId id="259" r:id="rId3"/>
     <p:sldId id="260" r:id="rId4"/>
+    <p:sldId id="261" r:id="rId5"/>
   </p:sldIdLst>
   <p:sldSz cx="12192000" cy="6858000"/>
   <p:notesSz cx="6858000" cy="9144000"/>
@@ -117,7 +118,7 @@
 <file path=ppt/revisionInfo.xml><?xml version="1.0" encoding="utf-8"?>
 <p1510:revInfo xmlns:a="http://schemas.openxmlformats.org/drawingml/2006/main" xmlns:r="http://schemas.openxmlformats.org/officeDocument/2006/relationships" xmlns:p1510="http://schemas.microsoft.com/office/powerpoint/2015/10/main">
   <p1510:revLst>
-    <p1510:client id="{21BFE2AE-A997-4283-BAD2-5C08E05FB8AE}" v="7" dt="2022-12-15T15:18:02.632"/>
+    <p1510:client id="{21BFE2AE-A997-4283-BAD2-5C08E05FB8AE}" v="16" dt="2022-12-17T11:38:59.470"/>
   </p1510:revLst>
 </p1510:revInfo>
 </file>
@@ -126,8 +127,8 @@
 <pc:chgInfo xmlns:a="http://schemas.openxmlformats.org/drawingml/2006/main" xmlns:r="http://schemas.openxmlformats.org/officeDocument/2006/relationships" xmlns:ac="http://schemas.microsoft.com/office/drawing/2013/main/command" xmlns:pc="http://schemas.microsoft.com/office/powerpoint/2013/main/command">
   <pc:docChgLst>
     <pc:chgData name="Barritault, Denis" userId="31958905-2920-4fef-84d2-b4723818abb1" providerId="ADAL" clId="{21BFE2AE-A997-4283-BAD2-5C08E05FB8AE}"/>
-    <pc:docChg chg="addSld delSld modSld">
-      <pc:chgData name="Barritault, Denis" userId="31958905-2920-4fef-84d2-b4723818abb1" providerId="ADAL" clId="{21BFE2AE-A997-4283-BAD2-5C08E05FB8AE}" dt="2022-12-15T15:18:02.632" v="50" actId="164"/>
+    <pc:docChg chg="custSel addSld delSld modSld">
+      <pc:chgData name="Barritault, Denis" userId="31958905-2920-4fef-84d2-b4723818abb1" providerId="ADAL" clId="{21BFE2AE-A997-4283-BAD2-5C08E05FB8AE}" dt="2022-12-17T11:38:59.470" v="216" actId="164"/>
       <pc:docMkLst>
         <pc:docMk/>
       </pc:docMkLst>
@@ -335,6 +336,101 @@
           </ac:picMkLst>
         </pc:picChg>
       </pc:sldChg>
+      <pc:sldChg chg="addSp delSp modSp new mod">
+        <pc:chgData name="Barritault, Denis" userId="31958905-2920-4fef-84d2-b4723818abb1" providerId="ADAL" clId="{21BFE2AE-A997-4283-BAD2-5C08E05FB8AE}" dt="2022-12-17T11:38:59.470" v="216" actId="164"/>
+        <pc:sldMkLst>
+          <pc:docMk/>
+          <pc:sldMk cId="3584381637" sldId="261"/>
+        </pc:sldMkLst>
+        <pc:spChg chg="add del">
+          <ac:chgData name="Barritault, Denis" userId="31958905-2920-4fef-84d2-b4723818abb1" providerId="ADAL" clId="{21BFE2AE-A997-4283-BAD2-5C08E05FB8AE}" dt="2022-12-17T11:36:11.672" v="57" actId="478"/>
+          <ac:spMkLst>
+            <pc:docMk/>
+            <pc:sldMk cId="3584381637" sldId="261"/>
+            <ac:spMk id="4" creationId="{8A317C9E-C7DE-85D6-5C08-1679F1897858}"/>
+          </ac:spMkLst>
+        </pc:spChg>
+        <pc:spChg chg="add mod">
+          <ac:chgData name="Barritault, Denis" userId="31958905-2920-4fef-84d2-b4723818abb1" providerId="ADAL" clId="{21BFE2AE-A997-4283-BAD2-5C08E05FB8AE}" dt="2022-12-17T11:38:59.470" v="216" actId="164"/>
+          <ac:spMkLst>
+            <pc:docMk/>
+            <pc:sldMk cId="3584381637" sldId="261"/>
+            <ac:spMk id="5" creationId="{DC5B71B1-7D14-CA51-92AC-649926116EDF}"/>
+          </ac:spMkLst>
+        </pc:spChg>
+        <pc:spChg chg="add mod">
+          <ac:chgData name="Barritault, Denis" userId="31958905-2920-4fef-84d2-b4723818abb1" providerId="ADAL" clId="{21BFE2AE-A997-4283-BAD2-5C08E05FB8AE}" dt="2022-12-17T11:38:59.470" v="216" actId="164"/>
+          <ac:spMkLst>
+            <pc:docMk/>
+            <pc:sldMk cId="3584381637" sldId="261"/>
+            <ac:spMk id="6" creationId="{7598D556-51E0-EA62-DFED-D0648769A3B8}"/>
+          </ac:spMkLst>
+        </pc:spChg>
+        <pc:spChg chg="add mod">
+          <ac:chgData name="Barritault, Denis" userId="31958905-2920-4fef-84d2-b4723818abb1" providerId="ADAL" clId="{21BFE2AE-A997-4283-BAD2-5C08E05FB8AE}" dt="2022-12-17T11:38:59.470" v="216" actId="164"/>
+          <ac:spMkLst>
+            <pc:docMk/>
+            <pc:sldMk cId="3584381637" sldId="261"/>
+            <ac:spMk id="7" creationId="{DA1D6196-4834-50E4-28AB-00F37AC61472}"/>
+          </ac:spMkLst>
+        </pc:spChg>
+        <pc:spChg chg="add mod">
+          <ac:chgData name="Barritault, Denis" userId="31958905-2920-4fef-84d2-b4723818abb1" providerId="ADAL" clId="{21BFE2AE-A997-4283-BAD2-5C08E05FB8AE}" dt="2022-12-17T11:38:59.470" v="216" actId="164"/>
+          <ac:spMkLst>
+            <pc:docMk/>
+            <pc:sldMk cId="3584381637" sldId="261"/>
+            <ac:spMk id="8" creationId="{EF7FF31C-F45D-BEBF-3EB6-8F7B4E961930}"/>
+          </ac:spMkLst>
+        </pc:spChg>
+        <pc:spChg chg="add mod">
+          <ac:chgData name="Barritault, Denis" userId="31958905-2920-4fef-84d2-b4723818abb1" providerId="ADAL" clId="{21BFE2AE-A997-4283-BAD2-5C08E05FB8AE}" dt="2022-12-17T11:38:59.470" v="216" actId="164"/>
+          <ac:spMkLst>
+            <pc:docMk/>
+            <pc:sldMk cId="3584381637" sldId="261"/>
+            <ac:spMk id="9" creationId="{55960FA4-3A5C-732F-3E1B-2F126D65ADA0}"/>
+          </ac:spMkLst>
+        </pc:spChg>
+        <pc:spChg chg="add mod">
+          <ac:chgData name="Barritault, Denis" userId="31958905-2920-4fef-84d2-b4723818abb1" providerId="ADAL" clId="{21BFE2AE-A997-4283-BAD2-5C08E05FB8AE}" dt="2022-12-17T11:38:59.470" v="216" actId="164"/>
+          <ac:spMkLst>
+            <pc:docMk/>
+            <pc:sldMk cId="3584381637" sldId="261"/>
+            <ac:spMk id="10" creationId="{B5A1532E-A8EC-BC71-179E-D3CDEAF8A486}"/>
+          </ac:spMkLst>
+        </pc:spChg>
+        <pc:spChg chg="add mod">
+          <ac:chgData name="Barritault, Denis" userId="31958905-2920-4fef-84d2-b4723818abb1" providerId="ADAL" clId="{21BFE2AE-A997-4283-BAD2-5C08E05FB8AE}" dt="2022-12-17T11:38:59.470" v="216" actId="164"/>
+          <ac:spMkLst>
+            <pc:docMk/>
+            <pc:sldMk cId="3584381637" sldId="261"/>
+            <ac:spMk id="11" creationId="{5732EE18-35A0-227D-B592-00E8013FA373}"/>
+          </ac:spMkLst>
+        </pc:spChg>
+        <pc:spChg chg="add del mod">
+          <ac:chgData name="Barritault, Denis" userId="31958905-2920-4fef-84d2-b4723818abb1" providerId="ADAL" clId="{21BFE2AE-A997-4283-BAD2-5C08E05FB8AE}" dt="2022-12-17T11:38:36.722" v="198" actId="478"/>
+          <ac:spMkLst>
+            <pc:docMk/>
+            <pc:sldMk cId="3584381637" sldId="261"/>
+            <ac:spMk id="12" creationId="{FA9FCD65-B065-114F-47EB-60621D53BB7C}"/>
+          </ac:spMkLst>
+        </pc:spChg>
+        <pc:grpChg chg="add mod">
+          <ac:chgData name="Barritault, Denis" userId="31958905-2920-4fef-84d2-b4723818abb1" providerId="ADAL" clId="{21BFE2AE-A997-4283-BAD2-5C08E05FB8AE}" dt="2022-12-17T11:38:59.470" v="216" actId="164"/>
+          <ac:grpSpMkLst>
+            <pc:docMk/>
+            <pc:sldMk cId="3584381637" sldId="261"/>
+            <ac:grpSpMk id="13" creationId="{EE488458-E586-47AB-4B74-A98435F4335C}"/>
+          </ac:grpSpMkLst>
+        </pc:grpChg>
+        <pc:picChg chg="add mod">
+          <ac:chgData name="Barritault, Denis" userId="31958905-2920-4fef-84d2-b4723818abb1" providerId="ADAL" clId="{21BFE2AE-A997-4283-BAD2-5C08E05FB8AE}" dt="2022-12-17T11:38:59.470" v="216" actId="164"/>
+          <ac:picMkLst>
+            <pc:docMk/>
+            <pc:sldMk cId="3584381637" sldId="261"/>
+            <ac:picMk id="3" creationId="{BD5BCC01-BFDD-1472-2034-6AF9C617B293}"/>
+          </ac:picMkLst>
+        </pc:picChg>
+      </pc:sldChg>
     </pc:docChg>
   </pc:docChgLst>
 </pc:chgInfo>
@@ -489,7 +585,7 @@
           <a:p>
             <a:fld id="{F49253E0-06C5-4072-9C84-F6FE16A4B26B}" type="datetimeFigureOut">
               <a:rPr lang="en-GB" smtClean="0"/>
-              <a:t>15/12/2022</a:t>
+              <a:t>17/12/2022</a:t>
             </a:fld>
             <a:endParaRPr lang="en-GB"/>
           </a:p>
@@ -689,7 +785,7 @@
           <a:p>
             <a:fld id="{F49253E0-06C5-4072-9C84-F6FE16A4B26B}" type="datetimeFigureOut">
               <a:rPr lang="en-GB" smtClean="0"/>
-              <a:t>15/12/2022</a:t>
+              <a:t>17/12/2022</a:t>
             </a:fld>
             <a:endParaRPr lang="en-GB"/>
           </a:p>
@@ -899,7 +995,7 @@
           <a:p>
             <a:fld id="{F49253E0-06C5-4072-9C84-F6FE16A4B26B}" type="datetimeFigureOut">
               <a:rPr lang="en-GB" smtClean="0"/>
-              <a:t>15/12/2022</a:t>
+              <a:t>17/12/2022</a:t>
             </a:fld>
             <a:endParaRPr lang="en-GB"/>
           </a:p>
@@ -1099,7 +1195,7 @@
           <a:p>
             <a:fld id="{F49253E0-06C5-4072-9C84-F6FE16A4B26B}" type="datetimeFigureOut">
               <a:rPr lang="en-GB" smtClean="0"/>
-              <a:t>15/12/2022</a:t>
+              <a:t>17/12/2022</a:t>
             </a:fld>
             <a:endParaRPr lang="en-GB"/>
           </a:p>
@@ -1375,7 +1471,7 @@
           <a:p>
             <a:fld id="{F49253E0-06C5-4072-9C84-F6FE16A4B26B}" type="datetimeFigureOut">
               <a:rPr lang="en-GB" smtClean="0"/>
-              <a:t>15/12/2022</a:t>
+              <a:t>17/12/2022</a:t>
             </a:fld>
             <a:endParaRPr lang="en-GB"/>
           </a:p>
@@ -1643,7 +1739,7 @@
           <a:p>
             <a:fld id="{F49253E0-06C5-4072-9C84-F6FE16A4B26B}" type="datetimeFigureOut">
               <a:rPr lang="en-GB" smtClean="0"/>
-              <a:t>15/12/2022</a:t>
+              <a:t>17/12/2022</a:t>
             </a:fld>
             <a:endParaRPr lang="en-GB"/>
           </a:p>
@@ -2058,7 +2154,7 @@
           <a:p>
             <a:fld id="{F49253E0-06C5-4072-9C84-F6FE16A4B26B}" type="datetimeFigureOut">
               <a:rPr lang="en-GB" smtClean="0"/>
-              <a:t>15/12/2022</a:t>
+              <a:t>17/12/2022</a:t>
             </a:fld>
             <a:endParaRPr lang="en-GB"/>
           </a:p>
@@ -2200,7 +2296,7 @@
           <a:p>
             <a:fld id="{F49253E0-06C5-4072-9C84-F6FE16A4B26B}" type="datetimeFigureOut">
               <a:rPr lang="en-GB" smtClean="0"/>
-              <a:t>15/12/2022</a:t>
+              <a:t>17/12/2022</a:t>
             </a:fld>
             <a:endParaRPr lang="en-GB"/>
           </a:p>
@@ -2313,7 +2409,7 @@
           <a:p>
             <a:fld id="{F49253E0-06C5-4072-9C84-F6FE16A4B26B}" type="datetimeFigureOut">
               <a:rPr lang="en-GB" smtClean="0"/>
-              <a:t>15/12/2022</a:t>
+              <a:t>17/12/2022</a:t>
             </a:fld>
             <a:endParaRPr lang="en-GB"/>
           </a:p>
@@ -2626,7 +2722,7 @@
           <a:p>
             <a:fld id="{F49253E0-06C5-4072-9C84-F6FE16A4B26B}" type="datetimeFigureOut">
               <a:rPr lang="en-GB" smtClean="0"/>
-              <a:t>15/12/2022</a:t>
+              <a:t>17/12/2022</a:t>
             </a:fld>
             <a:endParaRPr lang="en-GB"/>
           </a:p>
@@ -2915,7 +3011,7 @@
           <a:p>
             <a:fld id="{F49253E0-06C5-4072-9C84-F6FE16A4B26B}" type="datetimeFigureOut">
               <a:rPr lang="en-GB" smtClean="0"/>
-              <a:t>15/12/2022</a:t>
+              <a:t>17/12/2022</a:t>
             </a:fld>
             <a:endParaRPr lang="en-GB"/>
           </a:p>
@@ -3158,7 +3254,7 @@
           <a:p>
             <a:fld id="{F49253E0-06C5-4072-9C84-F6FE16A4B26B}" type="datetimeFigureOut">
               <a:rPr lang="en-GB" smtClean="0"/>
-              <a:t>15/12/2022</a:t>
+              <a:t>17/12/2022</a:t>
             </a:fld>
             <a:endParaRPr lang="en-GB"/>
           </a:p>
@@ -4532,6 +4628,476 @@
 </p:sld>
 </file>
 
+<file path=ppt/slides/slide4.xml><?xml version="1.0" encoding="utf-8"?>
+<p:sld xmlns:a="http://schemas.openxmlformats.org/drawingml/2006/main" xmlns:r="http://schemas.openxmlformats.org/officeDocument/2006/relationships" xmlns:p="http://schemas.openxmlformats.org/presentationml/2006/main">
+  <p:cSld>
+    <p:spTree>
+      <p:nvGrpSpPr>
+        <p:cNvPr id="1" name=""/>
+        <p:cNvGrpSpPr/>
+        <p:nvPr/>
+      </p:nvGrpSpPr>
+      <p:grpSpPr>
+        <a:xfrm>
+          <a:off x="0" y="0"/>
+          <a:ext cx="0" cy="0"/>
+          <a:chOff x="0" y="0"/>
+          <a:chExt cx="0" cy="0"/>
+        </a:xfrm>
+      </p:grpSpPr>
+      <p:grpSp>
+        <p:nvGrpSpPr>
+          <p:cNvPr id="13" name="Group 12">
+            <a:extLst>
+              <a:ext uri="{FF2B5EF4-FFF2-40B4-BE49-F238E27FC236}">
+                <a16:creationId xmlns:a16="http://schemas.microsoft.com/office/drawing/2014/main" id="{EE488458-E586-47AB-4B74-A98435F4335C}"/>
+              </a:ext>
+            </a:extLst>
+          </p:cNvPr>
+          <p:cNvGrpSpPr/>
+          <p:nvPr/>
+        </p:nvGrpSpPr>
+        <p:grpSpPr>
+          <a:xfrm>
+            <a:off x="1094389" y="328448"/>
+            <a:ext cx="10122778" cy="5774121"/>
+            <a:chOff x="1094389" y="328448"/>
+            <a:chExt cx="10122778" cy="5774121"/>
+          </a:xfrm>
+        </p:grpSpPr>
+        <p:pic>
+          <p:nvPicPr>
+            <p:cNvPr id="3" name="Picture 2" descr="A picture containing wall, indoor&#10;&#10;Description automatically generated">
+              <a:extLst>
+                <a:ext uri="{FF2B5EF4-FFF2-40B4-BE49-F238E27FC236}">
+                  <a16:creationId xmlns:a16="http://schemas.microsoft.com/office/drawing/2014/main" id="{BD5BCC01-BFDD-1472-2034-6AF9C617B293}"/>
+                </a:ext>
+              </a:extLst>
+            </p:cNvPr>
+            <p:cNvPicPr>
+              <a:picLocks noChangeAspect="1"/>
+            </p:cNvPicPr>
+            <p:nvPr/>
+          </p:nvPicPr>
+          <p:blipFill>
+            <a:blip r:embed="rId2">
+              <a:extLst>
+                <a:ext uri="{28A0092B-C50C-407E-A947-70E740481C1C}">
+                  <a14:useLocalDpi xmlns:a14="http://schemas.microsoft.com/office/drawing/2010/main" val="0"/>
+                </a:ext>
+              </a:extLst>
+            </a:blip>
+            <a:stretch>
+              <a:fillRect/>
+            </a:stretch>
+          </p:blipFill>
+          <p:spPr>
+            <a:xfrm rot="5400000">
+              <a:off x="3524250" y="0"/>
+              <a:ext cx="5143500" cy="6858000"/>
+            </a:xfrm>
+            <a:prstGeom prst="rect">
+              <a:avLst/>
+            </a:prstGeom>
+          </p:spPr>
+        </p:pic>
+        <p:sp>
+          <p:nvSpPr>
+            <p:cNvPr id="5" name="Speech Bubble: Rectangle 4">
+              <a:extLst>
+                <a:ext uri="{FF2B5EF4-FFF2-40B4-BE49-F238E27FC236}">
+                  <a16:creationId xmlns:a16="http://schemas.microsoft.com/office/drawing/2014/main" id="{DC5B71B1-7D14-CA51-92AC-649926116EDF}"/>
+                </a:ext>
+              </a:extLst>
+            </p:cNvPr>
+            <p:cNvSpPr/>
+            <p:nvPr/>
+          </p:nvSpPr>
+          <p:spPr>
+            <a:xfrm>
+              <a:off x="9293773" y="3176752"/>
+              <a:ext cx="1923394" cy="693682"/>
+            </a:xfrm>
+            <a:prstGeom prst="wedgeRectCallout">
+              <a:avLst>
+                <a:gd name="adj1" fmla="val -87283"/>
+                <a:gd name="adj2" fmla="val -2601"/>
+              </a:avLst>
+            </a:prstGeom>
+          </p:spPr>
+          <p:style>
+            <a:lnRef idx="2">
+              <a:schemeClr val="accent1">
+                <a:shade val="50000"/>
+              </a:schemeClr>
+            </a:lnRef>
+            <a:fillRef idx="1">
+              <a:schemeClr val="accent1"/>
+            </a:fillRef>
+            <a:effectRef idx="0">
+              <a:schemeClr val="accent1"/>
+            </a:effectRef>
+            <a:fontRef idx="minor">
+              <a:schemeClr val="lt1"/>
+            </a:fontRef>
+          </p:style>
+          <p:txBody>
+            <a:bodyPr rtlCol="0" anchor="ctr"/>
+            <a:lstStyle/>
+            <a:p>
+              <a:pPr algn="ctr"/>
+              <a:r>
+                <a:rPr lang="fr-FR" dirty="0" err="1"/>
+                <a:t>Groovebox</a:t>
+              </a:r>
+              <a:r>
+                <a:rPr lang="fr-FR" dirty="0"/>
+                <a:t> (Novation Circuit)</a:t>
+              </a:r>
+              <a:endParaRPr lang="en-GB" dirty="0"/>
+            </a:p>
+          </p:txBody>
+        </p:sp>
+        <p:sp>
+          <p:nvSpPr>
+            <p:cNvPr id="6" name="Speech Bubble: Rectangle 5">
+              <a:extLst>
+                <a:ext uri="{FF2B5EF4-FFF2-40B4-BE49-F238E27FC236}">
+                  <a16:creationId xmlns:a16="http://schemas.microsoft.com/office/drawing/2014/main" id="{7598D556-51E0-EA62-DFED-D0648769A3B8}"/>
+                </a:ext>
+              </a:extLst>
+            </p:cNvPr>
+            <p:cNvSpPr/>
+            <p:nvPr/>
+          </p:nvSpPr>
+          <p:spPr>
+            <a:xfrm>
+              <a:off x="8713076" y="1531883"/>
+              <a:ext cx="1923394" cy="693682"/>
+            </a:xfrm>
+            <a:prstGeom prst="wedgeRectCallout">
+              <a:avLst>
+                <a:gd name="adj1" fmla="val -87693"/>
+                <a:gd name="adj2" fmla="val 81490"/>
+              </a:avLst>
+            </a:prstGeom>
+          </p:spPr>
+          <p:style>
+            <a:lnRef idx="2">
+              <a:schemeClr val="accent1">
+                <a:shade val="50000"/>
+              </a:schemeClr>
+            </a:lnRef>
+            <a:fillRef idx="1">
+              <a:schemeClr val="accent1"/>
+            </a:fillRef>
+            <a:effectRef idx="0">
+              <a:schemeClr val="accent1"/>
+            </a:effectRef>
+            <a:fontRef idx="minor">
+              <a:schemeClr val="lt1"/>
+            </a:fontRef>
+          </p:style>
+          <p:txBody>
+            <a:bodyPr rtlCol="0" anchor="ctr"/>
+            <a:lstStyle/>
+            <a:p>
+              <a:pPr algn="ctr"/>
+              <a:r>
+                <a:rPr lang="fr-FR" dirty="0"/>
+                <a:t>MIDI over USB</a:t>
+              </a:r>
+              <a:endParaRPr lang="en-GB" dirty="0"/>
+            </a:p>
+          </p:txBody>
+        </p:sp>
+        <p:sp>
+          <p:nvSpPr>
+            <p:cNvPr id="7" name="Speech Bubble: Rectangle 6">
+              <a:extLst>
+                <a:ext uri="{FF2B5EF4-FFF2-40B4-BE49-F238E27FC236}">
+                  <a16:creationId xmlns:a16="http://schemas.microsoft.com/office/drawing/2014/main" id="{DA1D6196-4834-50E4-28AB-00F37AC61472}"/>
+                </a:ext>
+              </a:extLst>
+            </p:cNvPr>
+            <p:cNvSpPr/>
+            <p:nvPr/>
+          </p:nvSpPr>
+          <p:spPr>
+            <a:xfrm>
+              <a:off x="3915103" y="328448"/>
+              <a:ext cx="1923394" cy="693682"/>
+            </a:xfrm>
+            <a:prstGeom prst="wedgeRectCallout">
+              <a:avLst>
+                <a:gd name="adj1" fmla="val -3677"/>
+                <a:gd name="adj2" fmla="val 418990"/>
+              </a:avLst>
+            </a:prstGeom>
+          </p:spPr>
+          <p:style>
+            <a:lnRef idx="2">
+              <a:schemeClr val="accent1">
+                <a:shade val="50000"/>
+              </a:schemeClr>
+            </a:lnRef>
+            <a:fillRef idx="1">
+              <a:schemeClr val="accent1"/>
+            </a:fillRef>
+            <a:effectRef idx="0">
+              <a:schemeClr val="accent1"/>
+            </a:effectRef>
+            <a:fontRef idx="minor">
+              <a:schemeClr val="lt1"/>
+            </a:fontRef>
+          </p:style>
+          <p:txBody>
+            <a:bodyPr rtlCol="0" anchor="ctr"/>
+            <a:lstStyle/>
+            <a:p>
+              <a:pPr algn="ctr"/>
+              <a:r>
+                <a:rPr lang="fr-FR" dirty="0"/>
+                <a:t>Pico USB plug</a:t>
+              </a:r>
+              <a:endParaRPr lang="en-GB" dirty="0"/>
+            </a:p>
+          </p:txBody>
+        </p:sp>
+        <p:sp>
+          <p:nvSpPr>
+            <p:cNvPr id="8" name="Speech Bubble: Rectangle 7">
+              <a:extLst>
+                <a:ext uri="{FF2B5EF4-FFF2-40B4-BE49-F238E27FC236}">
+                  <a16:creationId xmlns:a16="http://schemas.microsoft.com/office/drawing/2014/main" id="{EF7FF31C-F45D-BEBF-3EB6-8F7B4E961930}"/>
+                </a:ext>
+              </a:extLst>
+            </p:cNvPr>
+            <p:cNvSpPr/>
+            <p:nvPr/>
+          </p:nvSpPr>
+          <p:spPr>
+            <a:xfrm>
+              <a:off x="1471448" y="959069"/>
+              <a:ext cx="1923394" cy="693682"/>
+            </a:xfrm>
+            <a:prstGeom prst="wedgeRectCallout">
+              <a:avLst>
+                <a:gd name="adj1" fmla="val 73782"/>
+                <a:gd name="adj2" fmla="val 176945"/>
+              </a:avLst>
+            </a:prstGeom>
+          </p:spPr>
+          <p:style>
+            <a:lnRef idx="2">
+              <a:schemeClr val="accent1">
+                <a:shade val="50000"/>
+              </a:schemeClr>
+            </a:lnRef>
+            <a:fillRef idx="1">
+              <a:schemeClr val="accent1"/>
+            </a:fillRef>
+            <a:effectRef idx="0">
+              <a:schemeClr val="accent1"/>
+            </a:effectRef>
+            <a:fontRef idx="minor">
+              <a:schemeClr val="lt1"/>
+            </a:fontRef>
+          </p:style>
+          <p:txBody>
+            <a:bodyPr rtlCol="0" anchor="ctr"/>
+            <a:lstStyle/>
+            <a:p>
+              <a:pPr algn="ctr"/>
+              <a:r>
+                <a:rPr lang="fr-FR" dirty="0"/>
+                <a:t>Power pack</a:t>
+              </a:r>
+              <a:endParaRPr lang="en-GB" dirty="0"/>
+            </a:p>
+          </p:txBody>
+        </p:sp>
+        <p:sp>
+          <p:nvSpPr>
+            <p:cNvPr id="9" name="Speech Bubble: Rectangle 8">
+              <a:extLst>
+                <a:ext uri="{FF2B5EF4-FFF2-40B4-BE49-F238E27FC236}">
+                  <a16:creationId xmlns:a16="http://schemas.microsoft.com/office/drawing/2014/main" id="{55960FA4-3A5C-732F-3E1B-2F126D65ADA0}"/>
+                </a:ext>
+              </a:extLst>
+            </p:cNvPr>
+            <p:cNvSpPr/>
+            <p:nvPr/>
+          </p:nvSpPr>
+          <p:spPr>
+            <a:xfrm>
+              <a:off x="8936421" y="5176345"/>
+              <a:ext cx="1923394" cy="693682"/>
+            </a:xfrm>
+            <a:prstGeom prst="wedgeRectCallout">
+              <a:avLst>
+                <a:gd name="adj1" fmla="val -155726"/>
+                <a:gd name="adj2" fmla="val 17854"/>
+              </a:avLst>
+            </a:prstGeom>
+          </p:spPr>
+          <p:style>
+            <a:lnRef idx="2">
+              <a:schemeClr val="accent1">
+                <a:shade val="50000"/>
+              </a:schemeClr>
+            </a:lnRef>
+            <a:fillRef idx="1">
+              <a:schemeClr val="accent1"/>
+            </a:fillRef>
+            <a:effectRef idx="0">
+              <a:schemeClr val="accent1"/>
+            </a:effectRef>
+            <a:fontRef idx="minor">
+              <a:schemeClr val="lt1"/>
+            </a:fontRef>
+          </p:style>
+          <p:txBody>
+            <a:bodyPr rtlCol="0" anchor="ctr"/>
+            <a:lstStyle/>
+            <a:p>
+              <a:pPr algn="ctr"/>
+              <a:r>
+                <a:rPr lang="fr-FR" dirty="0"/>
+                <a:t>Switch + LED</a:t>
+              </a:r>
+              <a:endParaRPr lang="en-GB" dirty="0"/>
+            </a:p>
+          </p:txBody>
+        </p:sp>
+        <p:sp>
+          <p:nvSpPr>
+            <p:cNvPr id="10" name="Speech Bubble: Rectangle 9">
+              <a:extLst>
+                <a:ext uri="{FF2B5EF4-FFF2-40B4-BE49-F238E27FC236}">
+                  <a16:creationId xmlns:a16="http://schemas.microsoft.com/office/drawing/2014/main" id="{B5A1532E-A8EC-BC71-179E-D3CDEAF8A486}"/>
+                </a:ext>
+              </a:extLst>
+            </p:cNvPr>
+            <p:cNvSpPr/>
+            <p:nvPr/>
+          </p:nvSpPr>
+          <p:spPr>
+            <a:xfrm>
+              <a:off x="1094389" y="5408887"/>
+              <a:ext cx="1923394" cy="693682"/>
+            </a:xfrm>
+            <a:prstGeom prst="wedgeRectCallout">
+              <a:avLst>
+                <a:gd name="adj1" fmla="val 113536"/>
+                <a:gd name="adj2" fmla="val -187829"/>
+              </a:avLst>
+            </a:prstGeom>
+          </p:spPr>
+          <p:style>
+            <a:lnRef idx="2">
+              <a:schemeClr val="accent1">
+                <a:shade val="50000"/>
+              </a:schemeClr>
+            </a:lnRef>
+            <a:fillRef idx="1">
+              <a:schemeClr val="accent1"/>
+            </a:fillRef>
+            <a:effectRef idx="0">
+              <a:schemeClr val="accent1"/>
+            </a:effectRef>
+            <a:fontRef idx="minor">
+              <a:schemeClr val="lt1"/>
+            </a:fontRef>
+          </p:style>
+          <p:txBody>
+            <a:bodyPr rtlCol="0" anchor="ctr"/>
+            <a:lstStyle/>
+            <a:p>
+              <a:pPr algn="ctr"/>
+              <a:r>
+                <a:rPr lang="fr-FR" dirty="0"/>
+                <a:t>Cable to </a:t>
+              </a:r>
+              <a:r>
+                <a:rPr lang="fr-FR" dirty="0" err="1"/>
+                <a:t>connect</a:t>
+              </a:r>
+              <a:r>
+                <a:rPr lang="fr-FR" dirty="0"/>
+                <a:t> switch to pico</a:t>
+              </a:r>
+              <a:endParaRPr lang="en-GB" dirty="0"/>
+            </a:p>
+          </p:txBody>
+        </p:sp>
+        <p:sp>
+          <p:nvSpPr>
+            <p:cNvPr id="11" name="Speech Bubble: Rectangle 10">
+              <a:extLst>
+                <a:ext uri="{FF2B5EF4-FFF2-40B4-BE49-F238E27FC236}">
+                  <a16:creationId xmlns:a16="http://schemas.microsoft.com/office/drawing/2014/main" id="{5732EE18-35A0-227D-B592-00E8013FA373}"/>
+                </a:ext>
+              </a:extLst>
+            </p:cNvPr>
+            <p:cNvSpPr/>
+            <p:nvPr/>
+          </p:nvSpPr>
+          <p:spPr>
+            <a:xfrm>
+              <a:off x="1250731" y="3323897"/>
+              <a:ext cx="1923394" cy="693682"/>
+            </a:xfrm>
+            <a:prstGeom prst="wedgeRectCallout">
+              <a:avLst>
+                <a:gd name="adj1" fmla="val 107389"/>
+                <a:gd name="adj2" fmla="val 36035"/>
+              </a:avLst>
+            </a:prstGeom>
+          </p:spPr>
+          <p:style>
+            <a:lnRef idx="2">
+              <a:schemeClr val="accent1">
+                <a:shade val="50000"/>
+              </a:schemeClr>
+            </a:lnRef>
+            <a:fillRef idx="1">
+              <a:schemeClr val="accent1"/>
+            </a:fillRef>
+            <a:effectRef idx="0">
+              <a:schemeClr val="accent1"/>
+            </a:effectRef>
+            <a:fontRef idx="minor">
+              <a:schemeClr val="lt1"/>
+            </a:fontRef>
+          </p:style>
+          <p:txBody>
+            <a:bodyPr rtlCol="0" anchor="ctr"/>
+            <a:lstStyle/>
+            <a:p>
+              <a:pPr algn="ctr"/>
+              <a:r>
+                <a:rPr lang="fr-FR" dirty="0"/>
+                <a:t>Pico in a case</a:t>
+              </a:r>
+              <a:endParaRPr lang="en-GB" dirty="0"/>
+            </a:p>
+          </p:txBody>
+        </p:sp>
+      </p:grpSp>
+    </p:spTree>
+    <p:extLst>
+      <p:ext uri="{BB962C8B-B14F-4D97-AF65-F5344CB8AC3E}">
+        <p14:creationId xmlns:p14="http://schemas.microsoft.com/office/powerpoint/2010/main" val="3584381637"/>
+      </p:ext>
+    </p:extLst>
+  </p:cSld>
+  <p:clrMapOvr>
+    <a:masterClrMapping/>
+  </p:clrMapOvr>
+</p:sld>
+</file>
+
 <file path=ppt/theme/theme1.xml><?xml version="1.0" encoding="utf-8"?>
 <a:theme xmlns:a="http://schemas.openxmlformats.org/drawingml/2006/main" name="Office Theme">
   <a:themeElements>

</xml_diff>